<commit_message>
Mention that transitivity of equivalence is not always needed.
</commit_message>
<xml_diff>
--- a/2023/RU.pptx
+++ b/2023/RU.pptx
@@ -120,6 +120,11 @@
       </a:defRPr>
     </a:lvl9pPr>
   </p:defaultTextStyle>
+  <p:extLst>
+    <p:ext uri="{EFAFB233-063F-42B5-8137-9DF3F51BA10A}">
+      <p15:sldGuideLst xmlns:p15="http://schemas.microsoft.com/office/powerpoint/2012/main"/>
+    </p:ext>
+  </p:extLst>
 </p:presentation>
 </file>
 
@@ -270,7 +275,7 @@
           <a:p>
             <a:fld id="{689FC7A7-397F-48E4-A06C-F522986685D6}" type="datetimeFigureOut">
               <a:rPr lang="en-US" smtClean="0"/>
-              <a:t>4/9/2023</a:t>
+              <a:t>4/10/2023</a:t>
             </a:fld>
             <a:endParaRPr lang="en-US"/>
           </a:p>
@@ -468,7 +473,7 @@
           <a:p>
             <a:fld id="{689FC7A7-397F-48E4-A06C-F522986685D6}" type="datetimeFigureOut">
               <a:rPr lang="en-US" smtClean="0"/>
-              <a:t>4/9/2023</a:t>
+              <a:t>4/10/2023</a:t>
             </a:fld>
             <a:endParaRPr lang="en-US"/>
           </a:p>
@@ -676,7 +681,7 @@
           <a:p>
             <a:fld id="{689FC7A7-397F-48E4-A06C-F522986685D6}" type="datetimeFigureOut">
               <a:rPr lang="en-US" smtClean="0"/>
-              <a:t>4/9/2023</a:t>
+              <a:t>4/10/2023</a:t>
             </a:fld>
             <a:endParaRPr lang="en-US"/>
           </a:p>
@@ -874,7 +879,7 @@
           <a:p>
             <a:fld id="{689FC7A7-397F-48E4-A06C-F522986685D6}" type="datetimeFigureOut">
               <a:rPr lang="en-US" smtClean="0"/>
-              <a:t>4/9/2023</a:t>
+              <a:t>4/10/2023</a:t>
             </a:fld>
             <a:endParaRPr lang="en-US"/>
           </a:p>
@@ -1149,7 +1154,7 @@
           <a:p>
             <a:fld id="{689FC7A7-397F-48E4-A06C-F522986685D6}" type="datetimeFigureOut">
               <a:rPr lang="en-US" smtClean="0"/>
-              <a:t>4/9/2023</a:t>
+              <a:t>4/10/2023</a:t>
             </a:fld>
             <a:endParaRPr lang="en-US"/>
           </a:p>
@@ -1414,7 +1419,7 @@
           <a:p>
             <a:fld id="{689FC7A7-397F-48E4-A06C-F522986685D6}" type="datetimeFigureOut">
               <a:rPr lang="en-US" smtClean="0"/>
-              <a:t>4/9/2023</a:t>
+              <a:t>4/10/2023</a:t>
             </a:fld>
             <a:endParaRPr lang="en-US"/>
           </a:p>
@@ -1826,7 +1831,7 @@
           <a:p>
             <a:fld id="{689FC7A7-397F-48E4-A06C-F522986685D6}" type="datetimeFigureOut">
               <a:rPr lang="en-US" smtClean="0"/>
-              <a:t>4/9/2023</a:t>
+              <a:t>4/10/2023</a:t>
             </a:fld>
             <a:endParaRPr lang="en-US"/>
           </a:p>
@@ -1967,7 +1972,7 @@
           <a:p>
             <a:fld id="{689FC7A7-397F-48E4-A06C-F522986685D6}" type="datetimeFigureOut">
               <a:rPr lang="en-US" smtClean="0"/>
-              <a:t>4/9/2023</a:t>
+              <a:t>4/10/2023</a:t>
             </a:fld>
             <a:endParaRPr lang="en-US"/>
           </a:p>
@@ -2080,7 +2085,7 @@
           <a:p>
             <a:fld id="{689FC7A7-397F-48E4-A06C-F522986685D6}" type="datetimeFigureOut">
               <a:rPr lang="en-US" smtClean="0"/>
-              <a:t>4/9/2023</a:t>
+              <a:t>4/10/2023</a:t>
             </a:fld>
             <a:endParaRPr lang="en-US"/>
           </a:p>
@@ -2391,7 +2396,7 @@
           <a:p>
             <a:fld id="{689FC7A7-397F-48E4-A06C-F522986685D6}" type="datetimeFigureOut">
               <a:rPr lang="en-US" smtClean="0"/>
-              <a:t>4/9/2023</a:t>
+              <a:t>4/10/2023</a:t>
             </a:fld>
             <a:endParaRPr lang="en-US"/>
           </a:p>
@@ -2679,7 +2684,7 @@
           <a:p>
             <a:fld id="{689FC7A7-397F-48E4-A06C-F522986685D6}" type="datetimeFigureOut">
               <a:rPr lang="en-US" smtClean="0"/>
-              <a:t>4/9/2023</a:t>
+              <a:t>4/10/2023</a:t>
             </a:fld>
             <a:endParaRPr lang="en-US"/>
           </a:p>
@@ -2920,7 +2925,7 @@
           <a:p>
             <a:fld id="{689FC7A7-397F-48E4-A06C-F522986685D6}" type="datetimeFigureOut">
               <a:rPr lang="en-US" smtClean="0"/>
-              <a:t>4/9/2023</a:t>
+              <a:t>4/10/2023</a:t>
             </a:fld>
             <a:endParaRPr lang="en-US"/>
           </a:p>
@@ -4508,7 +4513,9 @@
         </p:nvSpPr>
         <p:spPr/>
         <p:txBody>
-          <a:bodyPr/>
+          <a:bodyPr>
+            <a:normAutofit lnSpcReduction="10000"/>
+          </a:bodyPr>
           <a:lstStyle/>
           <a:p>
             <a:r>
@@ -4520,6 +4527,63 @@
               <a:t> (strict weak ordering)</a:t>
             </a:r>
             <a:endParaRPr lang="ru-RU" dirty="0"/>
+          </a:p>
+          <a:p>
+            <a:r>
+              <a:rPr lang="ru-RU" dirty="0"/>
+              <a:t>Не всем алгоритмам требуется транзитивность эквивалентности</a:t>
+            </a:r>
+            <a:r>
+              <a:rPr lang="en-US" dirty="0"/>
+              <a:t>!</a:t>
+            </a:r>
+          </a:p>
+          <a:p>
+            <a:pPr lvl="1"/>
+            <a:r>
+              <a:rPr lang="ru-RU" dirty="0"/>
+              <a:t>Например</a:t>
+            </a:r>
+            <a:r>
+              <a:rPr lang="en-US" dirty="0"/>
+              <a:t> </a:t>
+            </a:r>
+            <a:r>
+              <a:rPr lang="ru-RU" dirty="0"/>
+              <a:t>для </a:t>
+            </a:r>
+            <a:r>
+              <a:rPr lang="en-US" dirty="0"/>
+              <a:t>std::min/</a:t>
+            </a:r>
+            <a:r>
+              <a:rPr lang="en-US" dirty="0" err="1"/>
+              <a:t>min_element</a:t>
+            </a:r>
+            <a:r>
+              <a:rPr lang="en-US" dirty="0"/>
+              <a:t> </a:t>
+            </a:r>
+            <a:r>
+              <a:rPr lang="ru-RU" dirty="0"/>
+              <a:t>достаточно частичного порядка</a:t>
+            </a:r>
+          </a:p>
+          <a:p>
+            <a:pPr lvl="1"/>
+            <a:r>
+              <a:rPr lang="ru-RU" dirty="0"/>
+              <a:t>Скорее всего </a:t>
+            </a:r>
+            <a:r>
+              <a:rPr lang="en-US" dirty="0"/>
+              <a:t>strict weak ordering </a:t>
+            </a:r>
+            <a:r>
+              <a:rPr lang="ru-RU" dirty="0"/>
+              <a:t>решили требовать для всех алгоритмов для упрощения Стандарта</a:t>
+            </a:r>
+            <a:endParaRPr lang="en-US" dirty="0"/>
           </a:p>
           <a:p>
             <a:r>
@@ -6307,7 +6371,7 @@
           <a:p>
             <a:r>
               <a:rPr lang="en-US" dirty="0"/>
-              <a:t>Buffer overflow</a:t>
+              <a:t>Buffer overflow!</a:t>
             </a:r>
           </a:p>
         </p:txBody>

</xml_diff>

<commit_message>
Mention that transitivity of equiv is needed by all quick sort algorithms.
</commit_message>
<xml_diff>
--- a/2023/RU.pptx
+++ b/2023/RU.pptx
@@ -275,7 +275,7 @@
           <a:p>
             <a:fld id="{689FC7A7-397F-48E4-A06C-F522986685D6}" type="datetimeFigureOut">
               <a:rPr lang="en-US" smtClean="0"/>
-              <a:t>4/10/2023</a:t>
+              <a:t>4/11/2023</a:t>
             </a:fld>
             <a:endParaRPr lang="en-US"/>
           </a:p>
@@ -473,7 +473,7 @@
           <a:p>
             <a:fld id="{689FC7A7-397F-48E4-A06C-F522986685D6}" type="datetimeFigureOut">
               <a:rPr lang="en-US" smtClean="0"/>
-              <a:t>4/10/2023</a:t>
+              <a:t>4/11/2023</a:t>
             </a:fld>
             <a:endParaRPr lang="en-US"/>
           </a:p>
@@ -681,7 +681,7 @@
           <a:p>
             <a:fld id="{689FC7A7-397F-48E4-A06C-F522986685D6}" type="datetimeFigureOut">
               <a:rPr lang="en-US" smtClean="0"/>
-              <a:t>4/10/2023</a:t>
+              <a:t>4/11/2023</a:t>
             </a:fld>
             <a:endParaRPr lang="en-US"/>
           </a:p>
@@ -879,7 +879,7 @@
           <a:p>
             <a:fld id="{689FC7A7-397F-48E4-A06C-F522986685D6}" type="datetimeFigureOut">
               <a:rPr lang="en-US" smtClean="0"/>
-              <a:t>4/10/2023</a:t>
+              <a:t>4/11/2023</a:t>
             </a:fld>
             <a:endParaRPr lang="en-US"/>
           </a:p>
@@ -1154,7 +1154,7 @@
           <a:p>
             <a:fld id="{689FC7A7-397F-48E4-A06C-F522986685D6}" type="datetimeFigureOut">
               <a:rPr lang="en-US" smtClean="0"/>
-              <a:t>4/10/2023</a:t>
+              <a:t>4/11/2023</a:t>
             </a:fld>
             <a:endParaRPr lang="en-US"/>
           </a:p>
@@ -1419,7 +1419,7 @@
           <a:p>
             <a:fld id="{689FC7A7-397F-48E4-A06C-F522986685D6}" type="datetimeFigureOut">
               <a:rPr lang="en-US" smtClean="0"/>
-              <a:t>4/10/2023</a:t>
+              <a:t>4/11/2023</a:t>
             </a:fld>
             <a:endParaRPr lang="en-US"/>
           </a:p>
@@ -1831,7 +1831,7 @@
           <a:p>
             <a:fld id="{689FC7A7-397F-48E4-A06C-F522986685D6}" type="datetimeFigureOut">
               <a:rPr lang="en-US" smtClean="0"/>
-              <a:t>4/10/2023</a:t>
+              <a:t>4/11/2023</a:t>
             </a:fld>
             <a:endParaRPr lang="en-US"/>
           </a:p>
@@ -1972,7 +1972,7 @@
           <a:p>
             <a:fld id="{689FC7A7-397F-48E4-A06C-F522986685D6}" type="datetimeFigureOut">
               <a:rPr lang="en-US" smtClean="0"/>
-              <a:t>4/10/2023</a:t>
+              <a:t>4/11/2023</a:t>
             </a:fld>
             <a:endParaRPr lang="en-US"/>
           </a:p>
@@ -2085,7 +2085,7 @@
           <a:p>
             <a:fld id="{689FC7A7-397F-48E4-A06C-F522986685D6}" type="datetimeFigureOut">
               <a:rPr lang="en-US" smtClean="0"/>
-              <a:t>4/10/2023</a:t>
+              <a:t>4/11/2023</a:t>
             </a:fld>
             <a:endParaRPr lang="en-US"/>
           </a:p>
@@ -2396,7 +2396,7 @@
           <a:p>
             <a:fld id="{689FC7A7-397F-48E4-A06C-F522986685D6}" type="datetimeFigureOut">
               <a:rPr lang="en-US" smtClean="0"/>
-              <a:t>4/10/2023</a:t>
+              <a:t>4/11/2023</a:t>
             </a:fld>
             <a:endParaRPr lang="en-US"/>
           </a:p>
@@ -2684,7 +2684,7 @@
           <a:p>
             <a:fld id="{689FC7A7-397F-48E4-A06C-F522986685D6}" type="datetimeFigureOut">
               <a:rPr lang="en-US" smtClean="0"/>
-              <a:t>4/10/2023</a:t>
+              <a:t>4/11/2023</a:t>
             </a:fld>
             <a:endParaRPr lang="en-US"/>
           </a:p>
@@ -2925,7 +2925,7 @@
           <a:p>
             <a:fld id="{689FC7A7-397F-48E4-A06C-F522986685D6}" type="datetimeFigureOut">
               <a:rPr lang="en-US" smtClean="0"/>
-              <a:t>4/10/2023</a:t>
+              <a:t>4/11/2023</a:t>
             </a:fld>
             <a:endParaRPr lang="en-US"/>
           </a:p>
@@ -4328,7 +4328,9 @@
         </p:nvSpPr>
         <p:spPr/>
         <p:txBody>
-          <a:bodyPr/>
+          <a:bodyPr>
+            <a:normAutofit lnSpcReduction="10000"/>
+          </a:bodyPr>
           <a:lstStyle/>
           <a:p>
             <a:r>
@@ -4430,6 +4432,36 @@
             </a:r>
           </a:p>
           <a:p>
+            <a:r>
+              <a:rPr lang="ru-RU" dirty="0"/>
+              <a:t>Необходимое условие для всех </a:t>
+            </a:r>
+            <a:r>
+              <a:rPr lang="en-US" dirty="0"/>
+              <a:t>“</a:t>
+            </a:r>
+            <a:r>
+              <a:rPr lang="ru-RU" dirty="0"/>
+              <a:t>быстрых</a:t>
+            </a:r>
+            <a:r>
+              <a:rPr lang="en-US" dirty="0"/>
+              <a:t>” </a:t>
+            </a:r>
+            <a:r>
+              <a:rPr lang="ru-RU" dirty="0"/>
+              <a:t>алгоритмов сортировки (см. </a:t>
+            </a:r>
+            <a:r>
+              <a:rPr lang="en-US" dirty="0">
+                <a:hlinkClick r:id="rId2"/>
+              </a:rPr>
+              <a:t>Why do we need transitivity of equivalence</a:t>
+            </a:r>
+            <a:r>
+              <a:rPr lang="en-US" dirty="0"/>
+              <a:t>)</a:t>
+            </a:r>
             <a:endParaRPr lang="ru-RU" dirty="0"/>
           </a:p>
           <a:p>

</xml_diff>

<commit_message>
Fixed comments by Feodor.
</commit_message>
<xml_diff>
--- a/2023/RU.pptx
+++ b/2023/RU.pptx
@@ -261,7 +261,7 @@
           <a:p>
             <a:fld id="{A36A2EB4-42A0-4A9F-94AC-04D10C1F231A}" type="datetimeFigureOut">
               <a:rPr lang="en-US" smtClean="0"/>
-              <a:t>5/2/2023</a:t>
+              <a:t>5/4/2023</a:t>
             </a:fld>
             <a:endParaRPr lang="en-US"/>
           </a:p>
@@ -2750,6 +2750,94 @@
 </p:notes>
 </file>
 
+<file path=ppt/notesSlides/notesSlide29.xml><?xml version="1.0" encoding="utf-8"?>
+<p:notes xmlns:a="http://schemas.openxmlformats.org/drawingml/2006/main" xmlns:r="http://schemas.openxmlformats.org/officeDocument/2006/relationships" xmlns:p="http://schemas.openxmlformats.org/presentationml/2006/main">
+  <p:cSld>
+    <p:spTree>
+      <p:nvGrpSpPr>
+        <p:cNvPr id="1" name=""/>
+        <p:cNvGrpSpPr/>
+        <p:nvPr/>
+      </p:nvGrpSpPr>
+      <p:grpSpPr>
+        <a:xfrm>
+          <a:off x="0" y="0"/>
+          <a:ext cx="0" cy="0"/>
+          <a:chOff x="0" y="0"/>
+          <a:chExt cx="0" cy="0"/>
+        </a:xfrm>
+      </p:grpSpPr>
+      <p:sp>
+        <p:nvSpPr>
+          <p:cNvPr id="2" name="Slide Image Placeholder 1"/>
+          <p:cNvSpPr>
+            <a:spLocks noGrp="1" noRot="1" noChangeAspect="1"/>
+          </p:cNvSpPr>
+          <p:nvPr>
+            <p:ph type="sldImg"/>
+          </p:nvPr>
+        </p:nvSpPr>
+        <p:spPr/>
+      </p:sp>
+      <p:sp>
+        <p:nvSpPr>
+          <p:cNvPr id="3" name="Notes Placeholder 2"/>
+          <p:cNvSpPr>
+            <a:spLocks noGrp="1"/>
+          </p:cNvSpPr>
+          <p:nvPr>
+            <p:ph type="body" idx="1"/>
+          </p:nvPr>
+        </p:nvSpPr>
+        <p:spPr/>
+        <p:txBody>
+          <a:bodyPr/>
+          <a:lstStyle/>
+          <a:p>
+            <a:r>
+              <a:rPr lang="ru-RU" dirty="0"/>
+              <a:t>Рандомизация также помогает находить больше ошибок в компараторах за счёт расширения покрытия тестируемых элементов.</a:t>
+            </a:r>
+            <a:endParaRPr lang="en-US" dirty="0"/>
+          </a:p>
+        </p:txBody>
+      </p:sp>
+      <p:sp>
+        <p:nvSpPr>
+          <p:cNvPr id="4" name="Slide Number Placeholder 3"/>
+          <p:cNvSpPr>
+            <a:spLocks noGrp="1"/>
+          </p:cNvSpPr>
+          <p:nvPr>
+            <p:ph type="sldNum" sz="quarter" idx="5"/>
+          </p:nvPr>
+        </p:nvSpPr>
+        <p:spPr/>
+        <p:txBody>
+          <a:bodyPr/>
+          <a:lstStyle/>
+          <a:p>
+            <a:fld id="{3AC94D10-082F-46D7-A834-266F9222130F}" type="slidenum">
+              <a:rPr lang="en-US" smtClean="0"/>
+              <a:t>47</a:t>
+            </a:fld>
+            <a:endParaRPr lang="en-US"/>
+          </a:p>
+        </p:txBody>
+      </p:sp>
+    </p:spTree>
+    <p:extLst>
+      <p:ext uri="{BB962C8B-B14F-4D97-AF65-F5344CB8AC3E}">
+        <p14:creationId xmlns:p14="http://schemas.microsoft.com/office/powerpoint/2010/main" val="196796120"/>
+      </p:ext>
+    </p:extLst>
+  </p:cSld>
+  <p:clrMapOvr>
+    <a:masterClrMapping/>
+  </p:clrMapOvr>
+</p:notes>
+</file>
+
 <file path=ppt/notesSlides/notesSlide3.xml><?xml version="1.0" encoding="utf-8"?>
 <p:notes xmlns:a="http://schemas.openxmlformats.org/drawingml/2006/main" xmlns:r="http://schemas.openxmlformats.org/officeDocument/2006/relationships" xmlns:p="http://schemas.openxmlformats.org/presentationml/2006/main">
   <p:cSld>
@@ -3764,7 +3852,7 @@
           <a:p>
             <a:fld id="{83D30A23-1FB6-43A1-891F-95145083C4E9}" type="datetime1">
               <a:rPr lang="en-US" smtClean="0"/>
-              <a:t>5/2/2023</a:t>
+              <a:t>5/4/2023</a:t>
             </a:fld>
             <a:endParaRPr lang="en-US"/>
           </a:p>
@@ -3962,7 +4050,7 @@
           <a:p>
             <a:fld id="{A4B03399-60D8-4226-8AC7-3F159D57E860}" type="datetime1">
               <a:rPr lang="en-US" smtClean="0"/>
-              <a:t>5/2/2023</a:t>
+              <a:t>5/4/2023</a:t>
             </a:fld>
             <a:endParaRPr lang="en-US"/>
           </a:p>
@@ -4170,7 +4258,7 @@
           <a:p>
             <a:fld id="{1A646459-A066-416D-8E21-9D451FB1CBED}" type="datetime1">
               <a:rPr lang="en-US" smtClean="0"/>
-              <a:t>5/2/2023</a:t>
+              <a:t>5/4/2023</a:t>
             </a:fld>
             <a:endParaRPr lang="en-US"/>
           </a:p>
@@ -4368,7 +4456,7 @@
           <a:p>
             <a:fld id="{0636B939-1A2A-498F-9013-EEF28820D750}" type="datetime1">
               <a:rPr lang="en-US" smtClean="0"/>
-              <a:t>5/2/2023</a:t>
+              <a:t>5/4/2023</a:t>
             </a:fld>
             <a:endParaRPr lang="en-US"/>
           </a:p>
@@ -4682,7 +4770,7 @@
           <a:p>
             <a:fld id="{97D3760A-E884-42F2-A44C-F32FAA030BF6}" type="datetime1">
               <a:rPr lang="en-US" smtClean="0"/>
-              <a:t>5/2/2023</a:t>
+              <a:t>5/4/2023</a:t>
             </a:fld>
             <a:endParaRPr lang="en-US"/>
           </a:p>
@@ -4947,7 +5035,7 @@
           <a:p>
             <a:fld id="{4FC7535E-ABF1-4A69-B09E-251EF8B13143}" type="datetime1">
               <a:rPr lang="en-US" smtClean="0"/>
-              <a:t>5/2/2023</a:t>
+              <a:t>5/4/2023</a:t>
             </a:fld>
             <a:endParaRPr lang="en-US"/>
           </a:p>
@@ -5359,7 +5447,7 @@
           <a:p>
             <a:fld id="{CE54BCFC-68A7-4C68-9600-D4AAA16CF9A6}" type="datetime1">
               <a:rPr lang="en-US" smtClean="0"/>
-              <a:t>5/2/2023</a:t>
+              <a:t>5/4/2023</a:t>
             </a:fld>
             <a:endParaRPr lang="en-US"/>
           </a:p>
@@ -5500,7 +5588,7 @@
           <a:p>
             <a:fld id="{0F981744-C4F3-4F58-9E0E-AF6C4E78D03B}" type="datetime1">
               <a:rPr lang="en-US" smtClean="0"/>
-              <a:t>5/2/2023</a:t>
+              <a:t>5/4/2023</a:t>
             </a:fld>
             <a:endParaRPr lang="en-US"/>
           </a:p>
@@ -5613,7 +5701,7 @@
           <a:p>
             <a:fld id="{98ED47E1-EA96-4683-9629-E838295B20BC}" type="datetime1">
               <a:rPr lang="en-US" smtClean="0"/>
-              <a:t>5/2/2023</a:t>
+              <a:t>5/4/2023</a:t>
             </a:fld>
             <a:endParaRPr lang="en-US"/>
           </a:p>
@@ -5924,7 +6012,7 @@
           <a:p>
             <a:fld id="{2F2A1627-B435-455B-A0CA-0808E5748D61}" type="datetime1">
               <a:rPr lang="en-US" smtClean="0"/>
-              <a:t>5/2/2023</a:t>
+              <a:t>5/4/2023</a:t>
             </a:fld>
             <a:endParaRPr lang="en-US"/>
           </a:p>
@@ -6212,7 +6300,7 @@
           <a:p>
             <a:fld id="{FE11CB43-EB9E-4C41-ACD2-0EC61FB429F2}" type="datetime1">
               <a:rPr lang="en-US" smtClean="0"/>
-              <a:t>5/2/2023</a:t>
+              <a:t>5/4/2023</a:t>
             </a:fld>
             <a:endParaRPr lang="en-US"/>
           </a:p>
@@ -6453,7 +6541,7 @@
           <a:p>
             <a:fld id="{CC0B8F92-0932-40E4-878B-3E2E4AAA6810}" type="datetime1">
               <a:rPr lang="en-US" smtClean="0"/>
-              <a:t>5/2/2023</a:t>
+              <a:t>5/4/2023</a:t>
             </a:fld>
             <a:endParaRPr lang="en-US"/>
           </a:p>
@@ -9943,7 +10031,9 @@
         </p:nvSpPr>
         <p:spPr/>
         <p:txBody>
-          <a:bodyPr/>
+          <a:bodyPr>
+            <a:normAutofit/>
+          </a:bodyPr>
           <a:lstStyle/>
           <a:p>
             <a:r>
@@ -9956,7 +10046,7 @@
             </a:r>
             <a:r>
               <a:rPr lang="ru-RU" dirty="0"/>
-              <a:t>лексикографический порядок</a:t>
+              <a:t>неправильный лексикографический порядок</a:t>
             </a:r>
             <a:endParaRPr lang="en-US" dirty="0"/>
           </a:p>
@@ -9980,7 +10070,7 @@
         </p:nvSpPr>
         <p:spPr>
           <a:xfrm>
-            <a:off x="620485" y="1814739"/>
+            <a:off x="620485" y="1901827"/>
             <a:ext cx="5127173" cy="4401004"/>
           </a:xfrm>
         </p:spPr>
@@ -10034,7 +10124,7 @@
         </p:nvSpPr>
         <p:spPr>
           <a:xfrm>
-            <a:off x="6096000" y="1690688"/>
+            <a:off x="6096000" y="1777776"/>
             <a:ext cx="5878286" cy="4100513"/>
           </a:xfrm>
           <a:prstGeom prst="rect">
@@ -14241,7 +14331,7 @@
           <a:p>
             <a:r>
               <a:rPr lang="ru-RU" dirty="0"/>
-              <a:t>Функции-предикаты для сравнения элементов какого-либо типа</a:t>
+              <a:t>Функторы-предикаты для сравнения элементов какого-либо типа</a:t>
             </a:r>
             <a:endParaRPr lang="en-US" dirty="0"/>
           </a:p>
@@ -14778,7 +14868,7 @@
                 <a:latin typeface="Courier New" panose="02070309020205020404" pitchFamily="49" charset="0"/>
                 <a:cs typeface="Courier New" panose="02070309020205020404" pitchFamily="49" charset="0"/>
               </a:rPr>
-              <a:t> tmp.cc -- -DN=50</a:t>
+              <a:t> tmp.cc -- -DSIZE=50</a:t>
             </a:r>
             <a:endParaRPr lang="en-US" dirty="0"/>
           </a:p>
@@ -14811,7 +14901,7 @@
                 <a:latin typeface="Courier New" panose="02070309020205020404" pitchFamily="49" charset="0"/>
                 <a:cs typeface="Courier New" panose="02070309020205020404" pitchFamily="49" charset="0"/>
               </a:rPr>
-              <a:t>$ g++ -g -DN=50 -</a:t>
+              <a:t>$ g++ -g -DSIZE=50 -</a:t>
             </a:r>
             <a:r>
               <a:rPr lang="en-US" dirty="0" err="1">
@@ -16048,14 +16138,14 @@
           <a:p>
             <a:r>
               <a:rPr lang="ru-RU" dirty="0"/>
-              <a:t>Неопределённый порядок сортировки эквивалентных элементов</a:t>
+              <a:t>Расчёт на определённый порядок сортировки эквивалентных элементов</a:t>
             </a:r>
           </a:p>
           <a:p>
             <a:pPr lvl="1"/>
             <a:r>
               <a:rPr lang="ru-RU" dirty="0"/>
-              <a:t>проверяется в </a:t>
+              <a:t>проверяется в отладочной </a:t>
             </a:r>
             <a:r>
               <a:rPr lang="en-US" dirty="0" err="1"/>
@@ -16067,25 +16157,15 @@
             </a:r>
             <a:r>
               <a:rPr lang="ru-RU" dirty="0"/>
+              <a:t>(-</a:t>
+            </a:r>
+            <a:r>
+              <a:rPr lang="en-US" dirty="0"/>
+              <a:t>D_LIBCPP_ENABLE_DEBUG_MODE) </a:t>
+            </a:r>
+            <a:r>
+              <a:rPr lang="ru-RU" dirty="0"/>
               <a:t>с помощью рандомизации</a:t>
-            </a:r>
-            <a:endParaRPr lang="en-US" dirty="0"/>
-          </a:p>
-          <a:p>
-            <a:pPr lvl="1"/>
-            <a:r>
-              <a:rPr lang="ru-RU" dirty="0">
-                <a:latin typeface="Courier New" panose="02070309020205020404" pitchFamily="49" charset="0"/>
-                <a:cs typeface="Courier New" panose="02070309020205020404" pitchFamily="49" charset="0"/>
-              </a:rPr>
-              <a:t>-</a:t>
-            </a:r>
-            <a:r>
-              <a:rPr lang="en-US" dirty="0">
-                <a:latin typeface="Courier New" panose="02070309020205020404" pitchFamily="49" charset="0"/>
-                <a:cs typeface="Courier New" panose="02070309020205020404" pitchFamily="49" charset="0"/>
-              </a:rPr>
-              <a:t>D_LIBCPP_DEBUG_RANDOMIZE_UNSPECIFIED_STABILITY_SEED</a:t>
             </a:r>
             <a:endParaRPr lang="en-US" dirty="0"/>
           </a:p>
@@ -17374,7 +17454,7 @@
                 <a:latin typeface="Courier New" panose="02070309020205020404" pitchFamily="49" charset="0"/>
                 <a:cs typeface="Courier New" panose="02070309020205020404" pitchFamily="49" charset="0"/>
               </a:rPr>
-              <a:t> &lt; N; ++</a:t>
+              <a:t> &lt; SIZE; ++</a:t>
             </a:r>
             <a:r>
               <a:rPr lang="en-US" dirty="0" err="1">
@@ -17640,7 +17720,7 @@
                 <a:latin typeface="Courier New" panose="02070309020205020404" pitchFamily="49" charset="0"/>
                 <a:cs typeface="Courier New" panose="02070309020205020404" pitchFamily="49" charset="0"/>
               </a:rPr>
-              <a:t>$ g++ -g -DN=10 bad.cc &amp;&amp; ./</a:t>
+              <a:t>$ g++ -g -DSIZE=10 bad.cc &amp;&amp; ./</a:t>
             </a:r>
             <a:r>
               <a:rPr lang="en-US" dirty="0" err="1">
@@ -17866,7 +17946,7 @@
                 <a:latin typeface="Courier New" panose="02070309020205020404" pitchFamily="49" charset="0"/>
                 <a:cs typeface="Courier New" panose="02070309020205020404" pitchFamily="49" charset="0"/>
               </a:rPr>
-              <a:t>$ g++ -g -DN=50 bad.cc &amp;&amp; ./</a:t>
+              <a:t>$ g++ -g -DSIZE=50 bad.cc &amp;&amp; ./</a:t>
             </a:r>
             <a:r>
               <a:rPr lang="en-US" dirty="0" err="1">
@@ -18101,7 +18181,7 @@
                 <a:latin typeface="Courier New" panose="02070309020205020404" pitchFamily="49" charset="0"/>
                 <a:cs typeface="Courier New" panose="02070309020205020404" pitchFamily="49" charset="0"/>
               </a:rPr>
-              <a:t>$ g++ -g -DN=50 -</a:t>
+              <a:t>$ g++ -g -DSIZE=50 -</a:t>
             </a:r>
             <a:r>
               <a:rPr lang="en-US" sz="1200" dirty="0" err="1">

</xml_diff>

<commit_message>
Added link to Phabricator PR.
</commit_message>
<xml_diff>
--- a/2023/RU.pptx
+++ b/2023/RU.pptx
@@ -23069,7 +23069,12 @@
             <p:ph idx="1"/>
           </p:nvPr>
         </p:nvSpPr>
-        <p:spPr/>
+        <p:spPr>
+          <a:xfrm>
+            <a:off x="838200" y="1825625"/>
+            <a:ext cx="9459686" cy="4351338"/>
+          </a:xfrm>
+        </p:spPr>
         <p:txBody>
           <a:bodyPr>
             <a:normAutofit lnSpcReduction="10000"/>
@@ -23138,7 +23143,17 @@
             </a:r>
             <a:r>
               <a:rPr lang="en-US" dirty="0"/>
-              <a:t>++ </a:t>
+              <a:t>++ (</a:t>
+            </a:r>
+            <a:r>
+              <a:rPr lang="en-US" dirty="0">
+                <a:hlinkClick r:id="rId3"/>
+              </a:rPr>
+              <a:t>D150264</a:t>
+            </a:r>
+            <a:r>
+              <a:rPr lang="en-US" dirty="0"/>
+              <a:t>) </a:t>
             </a:r>
             <a:r>
               <a:rPr lang="ru-RU" dirty="0"/>
@@ -23155,6 +23170,42 @@
           </a:p>
         </p:txBody>
       </p:sp>
+      <p:pic>
+        <p:nvPicPr>
+          <p:cNvPr id="5" name="Picture 4">
+            <a:extLst>
+              <a:ext uri="{FF2B5EF4-FFF2-40B4-BE49-F238E27FC236}">
+                <a16:creationId xmlns:a16="http://schemas.microsoft.com/office/drawing/2014/main" id="{F5540649-238D-47A3-B432-74746BE5BB10}"/>
+              </a:ext>
+            </a:extLst>
+          </p:cNvPr>
+          <p:cNvPicPr>
+            <a:picLocks noChangeAspect="1"/>
+          </p:cNvPicPr>
+          <p:nvPr/>
+        </p:nvPicPr>
+        <p:blipFill>
+          <a:blip r:embed="rId4">
+            <a:extLst>
+              <a:ext uri="{28A0092B-C50C-407E-A947-70E740481C1C}">
+                <a14:useLocalDpi xmlns:a14="http://schemas.microsoft.com/office/drawing/2010/main" val="0"/>
+              </a:ext>
+            </a:extLst>
+          </a:blip>
+          <a:stretch>
+            <a:fillRect/>
+          </a:stretch>
+        </p:blipFill>
+        <p:spPr>
+          <a:xfrm>
+            <a:off x="9111343" y="5055961"/>
+            <a:ext cx="1436914" cy="1436914"/>
+          </a:xfrm>
+          <a:prstGeom prst="rect">
+            <a:avLst/>
+          </a:prstGeom>
+        </p:spPr>
+      </p:pic>
     </p:spTree>
     <p:extLst>
       <p:ext uri="{BB962C8B-B14F-4D97-AF65-F5344CB8AC3E}">

</xml_diff>

<commit_message>
Fixes before start of presentation.
</commit_message>
<xml_diff>
--- a/2023/RU.pptx
+++ b/2023/RU.pptx
@@ -264,7 +264,7 @@
           <a:p>
             <a:fld id="{A36A2EB4-42A0-4A9F-94AC-04D10C1F231A}" type="datetimeFigureOut">
               <a:rPr lang="en-US" smtClean="0"/>
-              <a:t>5/21/2023</a:t>
+              <a:t>5/24/2023</a:t>
             </a:fld>
             <a:endParaRPr lang="en-US"/>
           </a:p>
@@ -4047,7 +4047,7 @@
           <a:p>
             <a:fld id="{83D30A23-1FB6-43A1-891F-95145083C4E9}" type="datetime1">
               <a:rPr lang="en-US" smtClean="0"/>
-              <a:t>5/21/2023</a:t>
+              <a:t>5/24/2023</a:t>
             </a:fld>
             <a:endParaRPr lang="en-US"/>
           </a:p>
@@ -4245,7 +4245,7 @@
           <a:p>
             <a:fld id="{A4B03399-60D8-4226-8AC7-3F159D57E860}" type="datetime1">
               <a:rPr lang="en-US" smtClean="0"/>
-              <a:t>5/21/2023</a:t>
+              <a:t>5/24/2023</a:t>
             </a:fld>
             <a:endParaRPr lang="en-US"/>
           </a:p>
@@ -4453,7 +4453,7 @@
           <a:p>
             <a:fld id="{1A646459-A066-416D-8E21-9D451FB1CBED}" type="datetime1">
               <a:rPr lang="en-US" smtClean="0"/>
-              <a:t>5/21/2023</a:t>
+              <a:t>5/24/2023</a:t>
             </a:fld>
             <a:endParaRPr lang="en-US"/>
           </a:p>
@@ -4651,7 +4651,7 @@
           <a:p>
             <a:fld id="{0636B939-1A2A-498F-9013-EEF28820D750}" type="datetime1">
               <a:rPr lang="en-US" smtClean="0"/>
-              <a:t>5/21/2023</a:t>
+              <a:t>5/24/2023</a:t>
             </a:fld>
             <a:endParaRPr lang="en-US"/>
           </a:p>
@@ -4965,7 +4965,7 @@
           <a:p>
             <a:fld id="{97D3760A-E884-42F2-A44C-F32FAA030BF6}" type="datetime1">
               <a:rPr lang="en-US" smtClean="0"/>
-              <a:t>5/21/2023</a:t>
+              <a:t>5/24/2023</a:t>
             </a:fld>
             <a:endParaRPr lang="en-US"/>
           </a:p>
@@ -5230,7 +5230,7 @@
           <a:p>
             <a:fld id="{4FC7535E-ABF1-4A69-B09E-251EF8B13143}" type="datetime1">
               <a:rPr lang="en-US" smtClean="0"/>
-              <a:t>5/21/2023</a:t>
+              <a:t>5/24/2023</a:t>
             </a:fld>
             <a:endParaRPr lang="en-US"/>
           </a:p>
@@ -5642,7 +5642,7 @@
           <a:p>
             <a:fld id="{CE54BCFC-68A7-4C68-9600-D4AAA16CF9A6}" type="datetime1">
               <a:rPr lang="en-US" smtClean="0"/>
-              <a:t>5/21/2023</a:t>
+              <a:t>5/24/2023</a:t>
             </a:fld>
             <a:endParaRPr lang="en-US"/>
           </a:p>
@@ -5783,7 +5783,7 @@
           <a:p>
             <a:fld id="{0F981744-C4F3-4F58-9E0E-AF6C4E78D03B}" type="datetime1">
               <a:rPr lang="en-US" smtClean="0"/>
-              <a:t>5/21/2023</a:t>
+              <a:t>5/24/2023</a:t>
             </a:fld>
             <a:endParaRPr lang="en-US"/>
           </a:p>
@@ -5896,7 +5896,7 @@
           <a:p>
             <a:fld id="{98ED47E1-EA96-4683-9629-E838295B20BC}" type="datetime1">
               <a:rPr lang="en-US" smtClean="0"/>
-              <a:t>5/21/2023</a:t>
+              <a:t>5/24/2023</a:t>
             </a:fld>
             <a:endParaRPr lang="en-US"/>
           </a:p>
@@ -6207,7 +6207,7 @@
           <a:p>
             <a:fld id="{2F2A1627-B435-455B-A0CA-0808E5748D61}" type="datetime1">
               <a:rPr lang="en-US" smtClean="0"/>
-              <a:t>5/21/2023</a:t>
+              <a:t>5/24/2023</a:t>
             </a:fld>
             <a:endParaRPr lang="en-US"/>
           </a:p>
@@ -6495,7 +6495,7 @@
           <a:p>
             <a:fld id="{FE11CB43-EB9E-4C41-ACD2-0EC61FB429F2}" type="datetime1">
               <a:rPr lang="en-US" smtClean="0"/>
-              <a:t>5/21/2023</a:t>
+              <a:t>5/24/2023</a:t>
             </a:fld>
             <a:endParaRPr lang="en-US"/>
           </a:p>
@@ -6736,7 +6736,7 @@
           <a:p>
             <a:fld id="{CC0B8F92-0932-40E4-878B-3E2E4AAA6810}" type="datetime1">
               <a:rPr lang="en-US" smtClean="0"/>
-              <a:t>5/21/2023</a:t>
+              <a:t>5/24/2023</a:t>
             </a:fld>
             <a:endParaRPr lang="en-US"/>
           </a:p>
@@ -11097,11 +11097,19 @@
             <a:pPr lvl="1"/>
             <a:r>
               <a:rPr lang="ru-RU" dirty="0"/>
-              <a:t>Но Стандарт требует выполнения четырёх аксиом для всех алгоритмов (вероятно для упрощения</a:t>
+              <a:t>Но Стандарт для простоты требует выполнения четырёх аксиом для всех алгоритмов (кроме </a:t>
             </a:r>
             <a:r>
               <a:rPr lang="en-US" dirty="0"/>
-              <a:t>)</a:t>
+              <a:t>std::</a:t>
+            </a:r>
+            <a:r>
+              <a:rPr lang="en-US" dirty="0" err="1"/>
+              <a:t>binary_search</a:t>
+            </a:r>
+            <a:r>
+              <a:rPr lang="en-US" dirty="0"/>
+              <a:t> and friends)</a:t>
             </a:r>
           </a:p>
           <a:p>
@@ -25710,10 +25718,41 @@
               </a:rPr>
               <a:t>binary_search</a:t>
             </a:r>
-            <a:endParaRPr lang="en-US" dirty="0">
-              <a:latin typeface="Courier New" panose="02070309020205020404" pitchFamily="49" charset="0"/>
-              <a:cs typeface="Courier New" panose="02070309020205020404" pitchFamily="49" charset="0"/>
-            </a:endParaRPr>
+            <a:r>
+              <a:rPr lang="en-US" dirty="0">
+                <a:latin typeface="Courier New" panose="02070309020205020404" pitchFamily="49" charset="0"/>
+                <a:cs typeface="Courier New" panose="02070309020205020404" pitchFamily="49" charset="0"/>
+              </a:rPr>
+              <a:t>, std::</a:t>
+            </a:r>
+            <a:r>
+              <a:rPr lang="en-US" dirty="0" err="1">
+                <a:latin typeface="Courier New" panose="02070309020205020404" pitchFamily="49" charset="0"/>
+                <a:cs typeface="Courier New" panose="02070309020205020404" pitchFamily="49" charset="0"/>
+              </a:rPr>
+              <a:t>equal_range</a:t>
+            </a:r>
+            <a:r>
+              <a:rPr lang="en-US" dirty="0">
+                <a:latin typeface="Courier New" panose="02070309020205020404" pitchFamily="49" charset="0"/>
+                <a:cs typeface="Courier New" panose="02070309020205020404" pitchFamily="49" charset="0"/>
+              </a:rPr>
+              <a:t>, std::{</a:t>
+            </a:r>
+            <a:r>
+              <a:rPr lang="en-US" dirty="0" err="1">
+                <a:latin typeface="Courier New" panose="02070309020205020404" pitchFamily="49" charset="0"/>
+                <a:cs typeface="Courier New" panose="02070309020205020404" pitchFamily="49" charset="0"/>
+              </a:rPr>
+              <a:t>lower,upper</a:t>
+            </a:r>
+            <a:r>
+              <a:rPr lang="en-US" dirty="0">
+                <a:latin typeface="Courier New" panose="02070309020205020404" pitchFamily="49" charset="0"/>
+                <a:cs typeface="Courier New" panose="02070309020205020404" pitchFamily="49" charset="0"/>
+              </a:rPr>
+              <a:t>}_bound</a:t>
+            </a:r>
           </a:p>
           <a:p>
             <a:pPr lvl="1"/>
@@ -25722,84 +25761,21 @@
                 <a:latin typeface="Courier New" panose="02070309020205020404" pitchFamily="49" charset="0"/>
                 <a:cs typeface="Courier New" panose="02070309020205020404" pitchFamily="49" charset="0"/>
               </a:rPr>
-              <a:t>std::</a:t>
+              <a:t>std::{</a:t>
             </a:r>
             <a:r>
               <a:rPr lang="en-US" dirty="0" err="1">
                 <a:latin typeface="Courier New" panose="02070309020205020404" pitchFamily="49" charset="0"/>
                 <a:cs typeface="Courier New" panose="02070309020205020404" pitchFamily="49" charset="0"/>
               </a:rPr>
-              <a:t>equal_range</a:t>
-            </a:r>
-            <a:r>
-              <a:rPr lang="en-US" dirty="0">
-                <a:latin typeface="Courier New" panose="02070309020205020404" pitchFamily="49" charset="0"/>
-                <a:cs typeface="Courier New" panose="02070309020205020404" pitchFamily="49" charset="0"/>
-              </a:rPr>
-              <a:t>, std::</a:t>
-            </a:r>
-            <a:r>
-              <a:rPr lang="en-US" dirty="0" err="1">
-                <a:latin typeface="Courier New" panose="02070309020205020404" pitchFamily="49" charset="0"/>
-                <a:cs typeface="Courier New" panose="02070309020205020404" pitchFamily="49" charset="0"/>
-              </a:rPr>
-              <a:t>lower_bound</a:t>
-            </a:r>
-            <a:r>
-              <a:rPr lang="en-US" dirty="0">
-                <a:latin typeface="Courier New" panose="02070309020205020404" pitchFamily="49" charset="0"/>
-                <a:cs typeface="Courier New" panose="02070309020205020404" pitchFamily="49" charset="0"/>
-              </a:rPr>
-              <a:t>, std::</a:t>
-            </a:r>
-            <a:r>
-              <a:rPr lang="en-US" dirty="0" err="1">
-                <a:latin typeface="Courier New" panose="02070309020205020404" pitchFamily="49" charset="0"/>
-                <a:cs typeface="Courier New" panose="02070309020205020404" pitchFamily="49" charset="0"/>
-              </a:rPr>
-              <a:t>upper_bound</a:t>
-            </a:r>
-            <a:endParaRPr lang="en-US" dirty="0">
-              <a:latin typeface="Courier New" panose="02070309020205020404" pitchFamily="49" charset="0"/>
-              <a:cs typeface="Courier New" panose="02070309020205020404" pitchFamily="49" charset="0"/>
-            </a:endParaRPr>
-          </a:p>
-          <a:p>
-            <a:pPr lvl="1"/>
-            <a:r>
-              <a:rPr lang="en-US" dirty="0">
-                <a:latin typeface="Courier New" panose="02070309020205020404" pitchFamily="49" charset="0"/>
-                <a:cs typeface="Courier New" panose="02070309020205020404" pitchFamily="49" charset="0"/>
-              </a:rPr>
-              <a:t>std::</a:t>
-            </a:r>
-            <a:r>
-              <a:rPr lang="en-US" dirty="0" err="1">
-                <a:latin typeface="Courier New" panose="02070309020205020404" pitchFamily="49" charset="0"/>
-                <a:cs typeface="Courier New" panose="02070309020205020404" pitchFamily="49" charset="0"/>
-              </a:rPr>
-              <a:t>min_element</a:t>
-            </a:r>
-            <a:r>
-              <a:rPr lang="en-US" dirty="0">
-                <a:latin typeface="Courier New" panose="02070309020205020404" pitchFamily="49" charset="0"/>
-                <a:cs typeface="Courier New" panose="02070309020205020404" pitchFamily="49" charset="0"/>
-              </a:rPr>
-              <a:t>, std::</a:t>
-            </a:r>
-            <a:r>
-              <a:rPr lang="en-US" dirty="0" err="1">
-                <a:latin typeface="Courier New" panose="02070309020205020404" pitchFamily="49" charset="0"/>
-                <a:cs typeface="Courier New" panose="02070309020205020404" pitchFamily="49" charset="0"/>
-              </a:rPr>
-              <a:t>max_element</a:t>
-            </a:r>
-            <a:r>
-              <a:rPr lang="en-US" dirty="0">
-                <a:latin typeface="Courier New" panose="02070309020205020404" pitchFamily="49" charset="0"/>
-                <a:cs typeface="Courier New" panose="02070309020205020404" pitchFamily="49" charset="0"/>
-              </a:rPr>
-              <a:t>, std::</a:t>
+              <a:t>min,max</a:t>
+            </a:r>
+            <a:r>
+              <a:rPr lang="en-US" dirty="0">
+                <a:latin typeface="Courier New" panose="02070309020205020404" pitchFamily="49" charset="0"/>
+                <a:cs typeface="Courier New" panose="02070309020205020404" pitchFamily="49" charset="0"/>
+              </a:rPr>
+              <a:t>}_element, std::</a:t>
             </a:r>
             <a:r>
               <a:rPr lang="en-US" dirty="0" err="1">

</xml_diff>

<commit_message>
Fixed comments reported during the conference.
</commit_message>
<xml_diff>
--- a/2023/RU.pptx
+++ b/2023/RU.pptx
@@ -264,7 +264,7 @@
           <a:p>
             <a:fld id="{A36A2EB4-42A0-4A9F-94AC-04D10C1F231A}" type="datetimeFigureOut">
               <a:rPr lang="en-US" smtClean="0"/>
-              <a:t>5/24/2023</a:t>
+              <a:t>5/26/2023</a:t>
             </a:fld>
             <a:endParaRPr lang="en-US"/>
           </a:p>
@@ -4047,7 +4047,7 @@
           <a:p>
             <a:fld id="{83D30A23-1FB6-43A1-891F-95145083C4E9}" type="datetime1">
               <a:rPr lang="en-US" smtClean="0"/>
-              <a:t>5/24/2023</a:t>
+              <a:t>5/26/2023</a:t>
             </a:fld>
             <a:endParaRPr lang="en-US"/>
           </a:p>
@@ -4245,7 +4245,7 @@
           <a:p>
             <a:fld id="{A4B03399-60D8-4226-8AC7-3F159D57E860}" type="datetime1">
               <a:rPr lang="en-US" smtClean="0"/>
-              <a:t>5/24/2023</a:t>
+              <a:t>5/26/2023</a:t>
             </a:fld>
             <a:endParaRPr lang="en-US"/>
           </a:p>
@@ -4453,7 +4453,7 @@
           <a:p>
             <a:fld id="{1A646459-A066-416D-8E21-9D451FB1CBED}" type="datetime1">
               <a:rPr lang="en-US" smtClean="0"/>
-              <a:t>5/24/2023</a:t>
+              <a:t>5/26/2023</a:t>
             </a:fld>
             <a:endParaRPr lang="en-US"/>
           </a:p>
@@ -4651,7 +4651,7 @@
           <a:p>
             <a:fld id="{0636B939-1A2A-498F-9013-EEF28820D750}" type="datetime1">
               <a:rPr lang="en-US" smtClean="0"/>
-              <a:t>5/24/2023</a:t>
+              <a:t>5/26/2023</a:t>
             </a:fld>
             <a:endParaRPr lang="en-US"/>
           </a:p>
@@ -4965,7 +4965,7 @@
           <a:p>
             <a:fld id="{97D3760A-E884-42F2-A44C-F32FAA030BF6}" type="datetime1">
               <a:rPr lang="en-US" smtClean="0"/>
-              <a:t>5/24/2023</a:t>
+              <a:t>5/26/2023</a:t>
             </a:fld>
             <a:endParaRPr lang="en-US"/>
           </a:p>
@@ -5230,7 +5230,7 @@
           <a:p>
             <a:fld id="{4FC7535E-ABF1-4A69-B09E-251EF8B13143}" type="datetime1">
               <a:rPr lang="en-US" smtClean="0"/>
-              <a:t>5/24/2023</a:t>
+              <a:t>5/26/2023</a:t>
             </a:fld>
             <a:endParaRPr lang="en-US"/>
           </a:p>
@@ -5642,7 +5642,7 @@
           <a:p>
             <a:fld id="{CE54BCFC-68A7-4C68-9600-D4AAA16CF9A6}" type="datetime1">
               <a:rPr lang="en-US" smtClean="0"/>
-              <a:t>5/24/2023</a:t>
+              <a:t>5/26/2023</a:t>
             </a:fld>
             <a:endParaRPr lang="en-US"/>
           </a:p>
@@ -5783,7 +5783,7 @@
           <a:p>
             <a:fld id="{0F981744-C4F3-4F58-9E0E-AF6C4E78D03B}" type="datetime1">
               <a:rPr lang="en-US" smtClean="0"/>
-              <a:t>5/24/2023</a:t>
+              <a:t>5/26/2023</a:t>
             </a:fld>
             <a:endParaRPr lang="en-US"/>
           </a:p>
@@ -5896,7 +5896,7 @@
           <a:p>
             <a:fld id="{98ED47E1-EA96-4683-9629-E838295B20BC}" type="datetime1">
               <a:rPr lang="en-US" smtClean="0"/>
-              <a:t>5/24/2023</a:t>
+              <a:t>5/26/2023</a:t>
             </a:fld>
             <a:endParaRPr lang="en-US"/>
           </a:p>
@@ -6207,7 +6207,7 @@
           <a:p>
             <a:fld id="{2F2A1627-B435-455B-A0CA-0808E5748D61}" type="datetime1">
               <a:rPr lang="en-US" smtClean="0"/>
-              <a:t>5/24/2023</a:t>
+              <a:t>5/26/2023</a:t>
             </a:fld>
             <a:endParaRPr lang="en-US"/>
           </a:p>
@@ -6495,7 +6495,7 @@
           <a:p>
             <a:fld id="{FE11CB43-EB9E-4C41-ACD2-0EC61FB429F2}" type="datetime1">
               <a:rPr lang="en-US" smtClean="0"/>
-              <a:t>5/24/2023</a:t>
+              <a:t>5/26/2023</a:t>
             </a:fld>
             <a:endParaRPr lang="en-US"/>
           </a:p>
@@ -6736,7 +6736,7 @@
           <a:p>
             <a:fld id="{CC0B8F92-0932-40E4-878B-3E2E4AAA6810}" type="datetime1">
               <a:rPr lang="en-US" smtClean="0"/>
-              <a:t>5/24/2023</a:t>
+              <a:t>5/26/2023</a:t>
             </a:fld>
             <a:endParaRPr lang="en-US"/>
           </a:p>
@@ -12677,94 +12677,44 @@
               <a:t>(</a:t>
             </a:r>
             <a:r>
-              <a:rPr lang="en-US" u="sng" dirty="0">
-                <a:solidFill>
-                  <a:schemeClr val="accent2"/>
-                </a:solidFill>
-                <a:latin typeface="Courier New" panose="02070309020205020404" pitchFamily="49" charset="0"/>
-                <a:cs typeface="Courier New" panose="02070309020205020404" pitchFamily="49" charset="0"/>
-              </a:rPr>
-              <a:t>x </a:t>
-            </a:r>
-            <a:r>
-              <a:rPr lang="en-US" u="sng" dirty="0">
+              <a:rPr lang="en-US" dirty="0" err="1">
+                <a:solidFill>
+                  <a:schemeClr val="accent2"/>
+                </a:solidFill>
+                <a:latin typeface="Courier New" panose="02070309020205020404" pitchFamily="49" charset="0"/>
+                <a:cs typeface="Courier New" panose="02070309020205020404" pitchFamily="49" charset="0"/>
+              </a:rPr>
+              <a:t>rhs.x</a:t>
+            </a:r>
+            <a:r>
+              <a:rPr lang="en-US" dirty="0">
+                <a:solidFill>
+                  <a:schemeClr val="accent2"/>
+                </a:solidFill>
+                <a:latin typeface="Courier New" panose="02070309020205020404" pitchFamily="49" charset="0"/>
+                <a:cs typeface="Courier New" panose="02070309020205020404" pitchFamily="49" charset="0"/>
+              </a:rPr>
+              <a:t> </a:t>
+            </a:r>
+            <a:r>
+              <a:rPr lang="en-US" dirty="0">
                 <a:solidFill>
                   <a:schemeClr val="accent1"/>
                 </a:solidFill>
                 <a:latin typeface="Courier New" panose="02070309020205020404" pitchFamily="49" charset="0"/>
                 <a:cs typeface="Courier New" panose="02070309020205020404" pitchFamily="49" charset="0"/>
               </a:rPr>
-              <a:t>== </a:t>
-            </a:r>
-            <a:r>
-              <a:rPr lang="en-US" u="sng" dirty="0" err="1">
-                <a:solidFill>
-                  <a:schemeClr val="accent2"/>
-                </a:solidFill>
-                <a:latin typeface="Courier New" panose="02070309020205020404" pitchFamily="49" charset="0"/>
-                <a:cs typeface="Courier New" panose="02070309020205020404" pitchFamily="49" charset="0"/>
-              </a:rPr>
-              <a:t>rhs.x</a:t>
-            </a:r>
-            <a:r>
-              <a:rPr lang="en-US" u="sng" dirty="0">
-                <a:solidFill>
-                  <a:schemeClr val="accent2"/>
-                </a:solidFill>
-                <a:latin typeface="Courier New" panose="02070309020205020404" pitchFamily="49" charset="0"/>
-                <a:cs typeface="Courier New" panose="02070309020205020404" pitchFamily="49" charset="0"/>
-              </a:rPr>
-              <a:t> </a:t>
-            </a:r>
-            <a:r>
-              <a:rPr lang="en-US" u="sng" dirty="0">
-                <a:solidFill>
-                  <a:schemeClr val="accent1"/>
-                </a:solidFill>
-                <a:latin typeface="Courier New" panose="02070309020205020404" pitchFamily="49" charset="0"/>
-                <a:cs typeface="Courier New" panose="02070309020205020404" pitchFamily="49" charset="0"/>
-              </a:rPr>
-              <a:t>&amp;&amp;</a:t>
-            </a:r>
-            <a:r>
-              <a:rPr lang="en-US" dirty="0">
-                <a:solidFill>
-                  <a:schemeClr val="accent1"/>
-                </a:solidFill>
-                <a:latin typeface="Courier New" panose="02070309020205020404" pitchFamily="49" charset="0"/>
-                <a:cs typeface="Courier New" panose="02070309020205020404" pitchFamily="49" charset="0"/>
-              </a:rPr>
-              <a:t> </a:t>
-            </a:r>
-            <a:r>
-              <a:rPr lang="en-US" dirty="0">
-                <a:solidFill>
-                  <a:schemeClr val="accent2"/>
-                </a:solidFill>
-                <a:latin typeface="Courier New" panose="02070309020205020404" pitchFamily="49" charset="0"/>
-                <a:cs typeface="Courier New" panose="02070309020205020404" pitchFamily="49" charset="0"/>
-              </a:rPr>
-              <a:t>y </a:t>
-            </a:r>
-            <a:r>
-              <a:rPr lang="en-US" dirty="0">
-                <a:solidFill>
-                  <a:schemeClr val="accent1"/>
-                </a:solidFill>
-                <a:latin typeface="Courier New" panose="02070309020205020404" pitchFamily="49" charset="0"/>
-                <a:cs typeface="Courier New" panose="02070309020205020404" pitchFamily="49" charset="0"/>
-              </a:rPr>
               <a:t>&lt; </a:t>
             </a:r>
             <a:r>
-              <a:rPr lang="en-US" dirty="0" err="1">
-                <a:solidFill>
-                  <a:schemeClr val="accent2"/>
-                </a:solidFill>
-                <a:latin typeface="Courier New" panose="02070309020205020404" pitchFamily="49" charset="0"/>
-                <a:cs typeface="Courier New" panose="02070309020205020404" pitchFamily="49" charset="0"/>
-              </a:rPr>
-              <a:t>rhs.y</a:t>
+              <a:rPr lang="en-US" dirty="0">
+                <a:solidFill>
+                  <a:schemeClr val="accent2"/>
+                </a:solidFill>
+                <a:latin typeface="Courier New" panose="02070309020205020404" pitchFamily="49" charset="0"/>
+                <a:cs typeface="Courier New" panose="02070309020205020404" pitchFamily="49" charset="0"/>
+              </a:rPr>
+              <a:t>x</a:t>
             </a:r>
             <a:r>
               <a:rPr lang="en-US" dirty="0">
@@ -12793,7 +12743,7 @@
                 <a:latin typeface="Courier New" panose="02070309020205020404" pitchFamily="49" charset="0"/>
                 <a:cs typeface="Courier New" panose="02070309020205020404" pitchFamily="49" charset="0"/>
               </a:rPr>
-              <a:t>return true</a:t>
+              <a:t>return false</a:t>
             </a:r>
             <a:r>
               <a:rPr lang="en-US" dirty="0">
@@ -12815,7 +12765,51 @@
                 <a:latin typeface="Courier New" panose="02070309020205020404" pitchFamily="49" charset="0"/>
                 <a:cs typeface="Courier New" panose="02070309020205020404" pitchFamily="49" charset="0"/>
               </a:rPr>
-              <a:t>else</a:t>
+              <a:t>else if </a:t>
+            </a:r>
+            <a:r>
+              <a:rPr lang="en-US" dirty="0">
+                <a:latin typeface="Courier New" panose="02070309020205020404" pitchFamily="49" charset="0"/>
+                <a:cs typeface="Courier New" panose="02070309020205020404" pitchFamily="49" charset="0"/>
+              </a:rPr>
+              <a:t>(</a:t>
+            </a:r>
+            <a:r>
+              <a:rPr lang="en-US" dirty="0">
+                <a:solidFill>
+                  <a:schemeClr val="accent2"/>
+                </a:solidFill>
+                <a:latin typeface="Courier New" panose="02070309020205020404" pitchFamily="49" charset="0"/>
+                <a:cs typeface="Courier New" panose="02070309020205020404" pitchFamily="49" charset="0"/>
+              </a:rPr>
+              <a:t>y </a:t>
+            </a:r>
+            <a:r>
+              <a:rPr lang="en-US" dirty="0">
+                <a:solidFill>
+                  <a:schemeClr val="accent1"/>
+                </a:solidFill>
+                <a:latin typeface="Courier New" panose="02070309020205020404" pitchFamily="49" charset="0"/>
+                <a:cs typeface="Courier New" panose="02070309020205020404" pitchFamily="49" charset="0"/>
+              </a:rPr>
+              <a:t>&lt; </a:t>
+            </a:r>
+            <a:r>
+              <a:rPr lang="en-US" dirty="0" err="1">
+                <a:solidFill>
+                  <a:schemeClr val="accent2"/>
+                </a:solidFill>
+                <a:latin typeface="Courier New" panose="02070309020205020404" pitchFamily="49" charset="0"/>
+                <a:cs typeface="Courier New" panose="02070309020205020404" pitchFamily="49" charset="0"/>
+              </a:rPr>
+              <a:t>rhs.y</a:t>
+            </a:r>
+            <a:r>
+              <a:rPr lang="en-US" dirty="0">
+                <a:latin typeface="Courier New" panose="02070309020205020404" pitchFamily="49" charset="0"/>
+                <a:cs typeface="Courier New" panose="02070309020205020404" pitchFamily="49" charset="0"/>
+              </a:rPr>
+              <a:t>)</a:t>
             </a:r>
           </a:p>
           <a:p>
@@ -12824,12 +12818,56 @@
             </a:pPr>
             <a:r>
               <a:rPr lang="en-US" dirty="0">
+                <a:latin typeface="Courier New" panose="02070309020205020404" pitchFamily="49" charset="0"/>
+                <a:cs typeface="Courier New" panose="02070309020205020404" pitchFamily="49" charset="0"/>
+              </a:rPr>
+              <a:t>  </a:t>
+            </a:r>
+            <a:r>
+              <a:rPr lang="en-US" dirty="0">
                 <a:solidFill>
                   <a:srgbClr val="7030A0"/>
                 </a:solidFill>
                 <a:latin typeface="Courier New" panose="02070309020205020404" pitchFamily="49" charset="0"/>
                 <a:cs typeface="Courier New" panose="02070309020205020404" pitchFamily="49" charset="0"/>
               </a:rPr>
+              <a:t>return true</a:t>
+            </a:r>
+            <a:r>
+              <a:rPr lang="en-US" dirty="0">
+                <a:latin typeface="Courier New" panose="02070309020205020404" pitchFamily="49" charset="0"/>
+                <a:cs typeface="Courier New" panose="02070309020205020404" pitchFamily="49" charset="0"/>
+              </a:rPr>
+              <a:t>;</a:t>
+            </a:r>
+          </a:p>
+          <a:p>
+            <a:pPr marL="457200" lvl="1" indent="0">
+              <a:buNone/>
+            </a:pPr>
+            <a:r>
+              <a:rPr lang="en-US" dirty="0">
+                <a:solidFill>
+                  <a:srgbClr val="7030A0"/>
+                </a:solidFill>
+                <a:latin typeface="Courier New" panose="02070309020205020404" pitchFamily="49" charset="0"/>
+                <a:cs typeface="Courier New" panose="02070309020205020404" pitchFamily="49" charset="0"/>
+              </a:rPr>
+              <a:t>else</a:t>
+            </a:r>
+          </a:p>
+          <a:p>
+            <a:pPr marL="457200" lvl="1" indent="0">
+              <a:buNone/>
+            </a:pPr>
+            <a:r>
+              <a:rPr lang="en-US" dirty="0">
+                <a:solidFill>
+                  <a:srgbClr val="7030A0"/>
+                </a:solidFill>
+                <a:latin typeface="Courier New" panose="02070309020205020404" pitchFamily="49" charset="0"/>
+                <a:cs typeface="Courier New" panose="02070309020205020404" pitchFamily="49" charset="0"/>
+              </a:rPr>
               <a:t>  return false</a:t>
             </a:r>
             <a:r>
@@ -12839,6 +12877,58 @@
               </a:rPr>
               <a:t>;</a:t>
             </a:r>
+          </a:p>
+        </p:txBody>
+      </p:sp>
+      <p:sp>
+        <p:nvSpPr>
+          <p:cNvPr id="4" name="Rectangle 3">
+            <a:extLst>
+              <a:ext uri="{FF2B5EF4-FFF2-40B4-BE49-F238E27FC236}">
+                <a16:creationId xmlns:a16="http://schemas.microsoft.com/office/drawing/2014/main" id="{D91CCDD4-E7BA-4526-8265-7BCEF58C5E77}"/>
+              </a:ext>
+            </a:extLst>
+          </p:cNvPr>
+          <p:cNvSpPr/>
+          <p:nvPr/>
+        </p:nvSpPr>
+        <p:spPr>
+          <a:xfrm>
+            <a:off x="1246094" y="3228216"/>
+            <a:ext cx="3924621" cy="810384"/>
+          </a:xfrm>
+          <a:prstGeom prst="rect">
+            <a:avLst/>
+          </a:prstGeom>
+          <a:noFill/>
+          <a:ln w="47625">
+            <a:solidFill>
+              <a:srgbClr val="FF0000"/>
+            </a:solidFill>
+          </a:ln>
+        </p:spPr>
+        <p:style>
+          <a:lnRef idx="2">
+            <a:schemeClr val="accent1">
+              <a:shade val="50000"/>
+            </a:schemeClr>
+          </a:lnRef>
+          <a:fillRef idx="1">
+            <a:schemeClr val="accent1"/>
+          </a:fillRef>
+          <a:effectRef idx="0">
+            <a:schemeClr val="accent1"/>
+          </a:effectRef>
+          <a:fontRef idx="minor">
+            <a:schemeClr val="lt1"/>
+          </a:fontRef>
+        </p:style>
+        <p:txBody>
+          <a:bodyPr rtlCol="0" anchor="ctr"/>
+          <a:lstStyle/>
+          <a:p>
+            <a:pPr algn="ctr"/>
+            <a:endParaRPr lang="en-US"/>
           </a:p>
         </p:txBody>
       </p:sp>
@@ -24747,7 +24837,15 @@
             </a:r>
             <a:r>
               <a:rPr lang="en-US" dirty="0"/>
-              <a:t>O(N^3)</a:t>
+              <a:t>O(N</a:t>
+            </a:r>
+            <a:r>
+              <a:rPr lang="en-US" baseline="30000" dirty="0"/>
+              <a:t>3</a:t>
+            </a:r>
+            <a:r>
+              <a:rPr lang="en-US" dirty="0"/>
+              <a:t>)</a:t>
             </a:r>
             <a:endParaRPr lang="ru-RU" dirty="0"/>
           </a:p>
@@ -24940,7 +25038,15 @@
           <a:p>
             <a:r>
               <a:rPr lang="ru-RU" dirty="0"/>
-              <a:t>Снижает сложность до O(N^2) (по прежнему превосходит сложность проверяемых алгоритмов)</a:t>
+              <a:t>Снижает сложность до O(N</a:t>
+            </a:r>
+            <a:r>
+              <a:rPr lang="en-US" baseline="30000" dirty="0"/>
+              <a:t>2</a:t>
+            </a:r>
+            <a:r>
+              <a:rPr lang="ru-RU" dirty="0"/>
+              <a:t>) (по прежнему превосходит сложность проверяемых алгоритмов)</a:t>
             </a:r>
             <a:endParaRPr lang="en-US" dirty="0"/>
           </a:p>
@@ -25404,7 +25510,7 @@
             <a:pPr lvl="1"/>
             <a:r>
               <a:rPr lang="ru-RU" dirty="0"/>
-              <a:t>поддерживается в </a:t>
+              <a:t>Поддерживается в </a:t>
             </a:r>
             <a:r>
               <a:rPr lang="en-US" dirty="0" err="1"/>
@@ -25433,7 +25539,7 @@
             <a:pPr lvl="1"/>
             <a:r>
               <a:rPr lang="ru-RU" dirty="0"/>
-              <a:t>проверяется в отладочной </a:t>
+              <a:t>Проверяется в отладочной </a:t>
             </a:r>
             <a:r>
               <a:rPr lang="en-US" dirty="0" err="1"/>
@@ -25468,6 +25574,14 @@
             <a:r>
               <a:rPr lang="ru-RU" dirty="0"/>
               <a:t>с помощью рандомизации</a:t>
+            </a:r>
+            <a:endParaRPr lang="en-US" dirty="0"/>
+          </a:p>
+          <a:p>
+            <a:pPr lvl="1"/>
+            <a:r>
+              <a:rPr lang="ru-RU" dirty="0"/>
+              <a:t>Рандомизация также помогает провоцировать и диагностировать другие виды ошибок</a:t>
             </a:r>
             <a:endParaRPr lang="en-US" dirty="0"/>
           </a:p>
@@ -25886,7 +26000,7 @@
         <p:spPr/>
         <p:txBody>
           <a:bodyPr>
-            <a:normAutofit lnSpcReduction="10000"/>
+            <a:normAutofit fontScale="92500"/>
           </a:bodyPr>
           <a:lstStyle/>
           <a:p>
@@ -25930,6 +26044,14 @@
               <a:rPr lang="en-US" dirty="0"/>
               <a:t>==, !=, &lt;, &gt;, &lt;=, &gt;=)</a:t>
             </a:r>
+          </a:p>
+          <a:p>
+            <a:pPr lvl="1"/>
+            <a:r>
+              <a:rPr lang="ru-RU" dirty="0"/>
+              <a:t>Позволяет писать более эффективный код</a:t>
+            </a:r>
+            <a:endParaRPr lang="en-US" dirty="0"/>
           </a:p>
           <a:p>
             <a:r>

</xml_diff>